<commit_message>
sistemato refuso nella pagina delle conclusioni
</commit_message>
<xml_diff>
--- a/presentazioneMLDA.pptx
+++ b/presentazioneMLDA.pptx
@@ -16202,12 +16202,20 @@
           <a:lstStyle/>
           <a:p>
             <a:r>
+              <a:rPr lang="it-IT" sz="2400" dirty="0">
+                <a:solidFill>
+                  <a:schemeClr val="bg1"/>
+                </a:solidFill>
+              </a:rPr>
+              <a:t>By </a:t>
+            </a:r>
+            <a:r>
               <a:rPr lang="it-IT" sz="2400" dirty="0" err="1">
                 <a:solidFill>
                   <a:schemeClr val="bg1"/>
                 </a:solidFill>
               </a:rPr>
-              <a:t>Comparing</a:t>
+              <a:t>comparing</a:t>
             </a:r>
             <a:r>
               <a:rPr lang="it-IT" sz="2400" dirty="0">
@@ -16231,7 +16239,7 @@
                   <a:schemeClr val="bg1"/>
                 </a:solidFill>
               </a:rPr>
-              <a:t> of </a:t>
+              <a:t> of the </a:t>
             </a:r>
             <a:r>
               <a:rPr lang="it-IT" sz="2400" dirty="0" err="1">
@@ -16255,6 +16263,22 @@
                   <a:schemeClr val="bg1"/>
                 </a:solidFill>
               </a:rPr>
+              <a:t>algorithms</a:t>
+            </a:r>
+            <a:r>
+              <a:rPr lang="it-IT" sz="2400" dirty="0">
+                <a:solidFill>
+                  <a:schemeClr val="bg1"/>
+                </a:solidFill>
+              </a:rPr>
+              <a:t> </a:t>
+            </a:r>
+            <a:r>
+              <a:rPr lang="it-IT" sz="2400" dirty="0" err="1">
+                <a:solidFill>
+                  <a:schemeClr val="bg1"/>
+                </a:solidFill>
+              </a:rPr>
               <a:t>considered</a:t>
             </a:r>
             <a:r>
@@ -16271,7 +16295,7 @@
                   <a:schemeClr val="bg1"/>
                 </a:solidFill>
               </a:rPr>
-              <a:t>algorithms</a:t>
+              <a:t>we</a:t>
             </a:r>
             <a:r>
               <a:rPr lang="it-IT" sz="2400" dirty="0">
@@ -16279,7 +16303,7 @@
                   <a:schemeClr val="bg1"/>
                 </a:solidFill>
               </a:rPr>
-              <a:t> </a:t>
+              <a:t> can </a:t>
             </a:r>
             <a:r>
               <a:rPr lang="it-IT" sz="2400" dirty="0" err="1">
@@ -16287,23 +16311,7 @@
                   <a:schemeClr val="bg1"/>
                 </a:solidFill>
               </a:rPr>
-              <a:t>we</a:t>
-            </a:r>
-            <a:r>
-              <a:rPr lang="it-IT" sz="2400" dirty="0">
-                <a:solidFill>
-                  <a:schemeClr val="bg1"/>
-                </a:solidFill>
-              </a:rPr>
-              <a:t> can </a:t>
-            </a:r>
-            <a:r>
-              <a:rPr lang="it-IT" sz="2400" dirty="0" err="1">
-                <a:solidFill>
-                  <a:schemeClr val="bg1"/>
-                </a:solidFill>
-              </a:rPr>
-              <a:t>notice</a:t>
+              <a:t>see</a:t>
             </a:r>
             <a:r>
               <a:rPr lang="it-IT" sz="2400" dirty="0">
@@ -21945,15 +21953,6 @@
 </file>
 
 <file path=customXml/item1.xml><?xml version="1.0" encoding="utf-8"?>
-<p:properties xmlns:p="http://schemas.microsoft.com/office/2006/metadata/properties" xmlns:xsi="http://www.w3.org/2001/XMLSchema-instance" xmlns:pc="http://schemas.microsoft.com/office/infopath/2007/PartnerControls">
-  <documentManagement>
-    <Status xmlns="71af3243-3dd4-4a8d-8c0d-dd76da1f02a5">Not started</Status>
-    <MediaServiceKeyPoints xmlns="71af3243-3dd4-4a8d-8c0d-dd76da1f02a5" xsi:nil="true"/>
-  </documentManagement>
-</p:properties>
-</file>
-
-<file path=customXml/item2.xml><?xml version="1.0" encoding="utf-8"?>
 <ct:contentTypeSchema xmlns:ct="http://schemas.microsoft.com/office/2006/metadata/contentType" xmlns:ma="http://schemas.microsoft.com/office/2006/metadata/properties/metaAttributes" ct:_="" ma:_="" ma:contentTypeName="Document" ma:contentTypeID="0x01010079F111ED35F8CC479449609E8A0923A6" ma:contentTypeVersion="12" ma:contentTypeDescription="Create a new document." ma:contentTypeScope="" ma:versionID="426e97fa315356fffbdcd9876fe988c2">
   <xsd:schema xmlns:xsd="http://www.w3.org/2001/XMLSchema" xmlns:xs="http://www.w3.org/2001/XMLSchema" xmlns:p="http://schemas.microsoft.com/office/2006/metadata/properties" xmlns:ns2="71af3243-3dd4-4a8d-8c0d-dd76da1f02a5" xmlns:ns3="16c05727-aa75-4e4a-9b5f-8a80a1165891" targetNamespace="http://schemas.microsoft.com/office/2006/metadata/properties" ma:root="true" ma:fieldsID="14b8f0def80e6d70ce3def20c90759ae" ns2:_="" ns3:_="">
     <xsd:import namespace="71af3243-3dd4-4a8d-8c0d-dd76da1f02a5"/>
@@ -22174,6 +22173,15 @@
 </ct:contentTypeSchema>
 </file>
 
+<file path=customXml/item2.xml><?xml version="1.0" encoding="utf-8"?>
+<p:properties xmlns:p="http://schemas.microsoft.com/office/2006/metadata/properties" xmlns:xsi="http://www.w3.org/2001/XMLSchema-instance" xmlns:pc="http://schemas.microsoft.com/office/infopath/2007/PartnerControls">
+  <documentManagement>
+    <Status xmlns="71af3243-3dd4-4a8d-8c0d-dd76da1f02a5">Not started</Status>
+    <MediaServiceKeyPoints xmlns="71af3243-3dd4-4a8d-8c0d-dd76da1f02a5" xsi:nil="true"/>
+  </documentManagement>
+</p:properties>
+</file>
+
 <file path=customXml/item3.xml><?xml version="1.0" encoding="utf-8"?>
 <?mso-contentType ?>
 <FormTemplates xmlns="http://schemas.microsoft.com/sharepoint/v3/contenttype/forms">
@@ -22184,16 +22192,6 @@
 </file>
 
 <file path=customXml/itemProps1.xml><?xml version="1.0" encoding="utf-8"?>
-<ds:datastoreItem xmlns:ds="http://schemas.openxmlformats.org/officeDocument/2006/customXml" ds:itemID="{99919F73-B6C2-4A43-95E2-833EC48925FE}">
-  <ds:schemaRefs>
-    <ds:schemaRef ds:uri="http://schemas.microsoft.com/office/2006/metadata/properties"/>
-    <ds:schemaRef ds:uri="http://schemas.microsoft.com/office/infopath/2007/PartnerControls"/>
-    <ds:schemaRef ds:uri="71af3243-3dd4-4a8d-8c0d-dd76da1f02a5"/>
-  </ds:schemaRefs>
-</ds:datastoreItem>
-</file>
-
-<file path=customXml/itemProps2.xml><?xml version="1.0" encoding="utf-8"?>
 <ds:datastoreItem xmlns:ds="http://schemas.openxmlformats.org/officeDocument/2006/customXml" ds:itemID="{ABC329F5-30EE-4BF7-AA2A-B837B51416B4}">
   <ds:schemaRefs>
     <ds:schemaRef ds:uri="http://schemas.microsoft.com/office/2006/metadata/contentType"/>
@@ -22212,6 +22210,16 @@
 </ds:datastoreItem>
 </file>
 
+<file path=customXml/itemProps2.xml><?xml version="1.0" encoding="utf-8"?>
+<ds:datastoreItem xmlns:ds="http://schemas.openxmlformats.org/officeDocument/2006/customXml" ds:itemID="{99919F73-B6C2-4A43-95E2-833EC48925FE}">
+  <ds:schemaRefs>
+    <ds:schemaRef ds:uri="http://schemas.microsoft.com/office/2006/metadata/properties"/>
+    <ds:schemaRef ds:uri="http://schemas.microsoft.com/office/infopath/2007/PartnerControls"/>
+    <ds:schemaRef ds:uri="71af3243-3dd4-4a8d-8c0d-dd76da1f02a5"/>
+  </ds:schemaRefs>
+</ds:datastoreItem>
+</file>
+
 <file path=customXml/itemProps3.xml><?xml version="1.0" encoding="utf-8"?>
 <ds:datastoreItem xmlns:ds="http://schemas.openxmlformats.org/officeDocument/2006/customXml" ds:itemID="{3C8E00D1-8EA3-4E42-801D-0253E1EAFC21}">
   <ds:schemaRefs>

</xml_diff>

<commit_message>
aggiornato README.md e aggiunta suddivisione degli argomenti in presentazioneMLDA.pptx
</commit_message>
<xml_diff>
--- a/presentazioneMLDA.pptx
+++ b/presentazioneMLDA.pptx
@@ -259,7 +259,7 @@
           <a:p>
             <a:fld id="{73EDD7B2-2DB1-4292-9CED-B6D9BDCC5040}" type="datetime1">
               <a:rPr lang="it-IT" smtClean="0"/>
-              <a:t>12/10/2021</a:t>
+              <a:t>17/10/2021</a:t>
             </a:fld>
             <a:endParaRPr lang="it-IT" dirty="0"/>
           </a:p>
@@ -439,7 +439,7 @@
             <a:fld id="{456F714F-066B-41A5-A6BD-50516EB8C346}" type="datetime1">
               <a:rPr lang="it-IT" smtClean="0"/>
               <a:pPr/>
-              <a:t>12/10/2021</a:t>
+              <a:t>17/10/2021</a:t>
             </a:fld>
             <a:endParaRPr lang="it-IT" dirty="0"/>
           </a:p>
@@ -754,7 +754,10 @@
           <a:bodyPr/>
           <a:lstStyle/>
           <a:p>
-            <a:endParaRPr lang="it-IT"/>
+            <a:r>
+              <a:rPr lang="it-IT" dirty="0"/>
+              <a:t>Matteo</a:t>
+            </a:r>
           </a:p>
         </p:txBody>
       </p:sp>
@@ -841,8 +844,37 @@
           <a:p>
             <a:r>
               <a:rPr lang="it-IT" dirty="0"/>
-              <a:t>Notare il tempo di esecuzione!!</a:t>
-            </a:r>
+              <a:t>Davide: 10 </a:t>
+            </a:r>
+            <a:r>
+              <a:rPr lang="it-IT" dirty="0" err="1"/>
+              <a:t>fold</a:t>
+            </a:r>
+            <a:r>
+              <a:rPr lang="it-IT" dirty="0"/>
+              <a:t>-cross </a:t>
+            </a:r>
+            <a:r>
+              <a:rPr lang="it-IT" dirty="0" err="1"/>
+              <a:t>validation</a:t>
+            </a:r>
+            <a:r>
+              <a:rPr lang="it-IT" dirty="0"/>
+              <a:t> </a:t>
+            </a:r>
+            <a:r>
+              <a:rPr lang="it-IT" dirty="0">
+                <a:sym typeface="Wingdings" panose="05000000000000000000" pitchFamily="2" charset="2"/>
+              </a:rPr>
+              <a:t> 9 test e 1 </a:t>
+            </a:r>
+            <a:r>
+              <a:rPr lang="it-IT" dirty="0" err="1">
+                <a:sym typeface="Wingdings" panose="05000000000000000000" pitchFamily="2" charset="2"/>
+              </a:rPr>
+              <a:t>validation</a:t>
+            </a:r>
+            <a:endParaRPr lang="it-IT" dirty="0"/>
           </a:p>
         </p:txBody>
       </p:sp>
@@ -861,78 +893,19 @@
           <a:bodyPr/>
           <a:lstStyle/>
           <a:p>
-            <a:pPr marL="0" marR="0" lvl="0" indent="0" algn="r" defTabSz="914400" rtl="0" eaLnBrk="1" fontAlgn="auto" latinLnBrk="0" hangingPunct="1">
-              <a:lnSpc>
-                <a:spcPct val="100000"/>
-              </a:lnSpc>
-              <a:spcBef>
-                <a:spcPts val="0"/>
-              </a:spcBef>
-              <a:spcAft>
-                <a:spcPts val="0"/>
-              </a:spcAft>
-              <a:buClrTx/>
-              <a:buSzTx/>
-              <a:buFontTx/>
-              <a:buNone/>
-              <a:tabLst/>
-              <a:defRPr/>
-            </a:pPr>
+            <a:pPr rtl="0"/>
             <a:fld id="{D5939589-3E79-4C82-AA4A-FE78234FAA59}" type="slidenum">
-              <a:rPr kumimoji="0" lang="it-IT" sz="1200" b="0" i="0" u="none" strike="noStrike" kern="1200" cap="none" spc="0" normalizeH="0" baseline="0" noProof="0" smtClean="0">
-                <a:ln>
-                  <a:noFill/>
-                </a:ln>
-                <a:solidFill>
-                  <a:prstClr val="black"/>
-                </a:solidFill>
-                <a:effectLst/>
-                <a:uLnTx/>
-                <a:uFillTx/>
-                <a:latin typeface="Calibri" panose="020F0502020204030204"/>
-                <a:ea typeface="+mn-ea"/>
-                <a:cs typeface="+mn-cs"/>
-              </a:rPr>
-              <a:pPr marL="0" marR="0" lvl="0" indent="0" algn="r" defTabSz="914400" rtl="0" eaLnBrk="1" fontAlgn="auto" latinLnBrk="0" hangingPunct="1">
-                <a:lnSpc>
-                  <a:spcPct val="100000"/>
-                </a:lnSpc>
-                <a:spcBef>
-                  <a:spcPts val="0"/>
-                </a:spcBef>
-                <a:spcAft>
-                  <a:spcPts val="0"/>
-                </a:spcAft>
-                <a:buClrTx/>
-                <a:buSzTx/>
-                <a:buFontTx/>
-                <a:buNone/>
-                <a:tabLst/>
-                <a:defRPr/>
-              </a:pPr>
-              <a:t>13</a:t>
+              <a:rPr lang="it-IT" noProof="0" smtClean="0"/>
+              <a:t>10</a:t>
             </a:fld>
-            <a:endParaRPr kumimoji="0" lang="it-IT" sz="1200" b="0" i="0" u="none" strike="noStrike" kern="1200" cap="none" spc="0" normalizeH="0" baseline="0" noProof="0">
-              <a:ln>
-                <a:noFill/>
-              </a:ln>
-              <a:solidFill>
-                <a:prstClr val="black"/>
-              </a:solidFill>
-              <a:effectLst/>
-              <a:uLnTx/>
-              <a:uFillTx/>
-              <a:latin typeface="Calibri" panose="020F0502020204030204"/>
-              <a:ea typeface="+mn-ea"/>
-              <a:cs typeface="+mn-cs"/>
-            </a:endParaRPr>
+            <a:endParaRPr lang="it-IT" noProof="0"/>
           </a:p>
         </p:txBody>
       </p:sp>
     </p:spTree>
     <p:extLst>
       <p:ext uri="{BB962C8B-B14F-4D97-AF65-F5344CB8AC3E}">
-        <p14:creationId xmlns:p14="http://schemas.microsoft.com/office/powerpoint/2010/main" val="336771124"/>
+        <p14:creationId xmlns:p14="http://schemas.microsoft.com/office/powerpoint/2010/main" val="1151121713"/>
       </p:ext>
     </p:extLst>
   </p:cSld>
@@ -986,6 +959,24 @@
           <a:bodyPr/>
           <a:lstStyle/>
           <a:p>
+            <a:r>
+              <a:rPr lang="it-IT" dirty="0"/>
+              <a:t>Davide: R^2 (coefficiente di determinazione) parametro </a:t>
+            </a:r>
+            <a:r>
+              <a:rPr lang="it-IT" dirty="0" err="1"/>
+              <a:t>Accuracy</a:t>
+            </a:r>
+            <a:r>
+              <a:rPr lang="it-IT" dirty="0"/>
+              <a:t> </a:t>
+            </a:r>
+            <a:r>
+              <a:rPr lang="it-IT" dirty="0">
+                <a:sym typeface="Wingdings" panose="05000000000000000000" pitchFamily="2" charset="2"/>
+              </a:rPr>
+              <a:t> quanto è precisa la predizione effettuata R=1  valori predetti = reali, R=0 valori predetti = media di tutti i valori di y, R &lt; 0 =modello errato.</a:t>
+            </a:r>
             <a:endParaRPr lang="it-IT" dirty="0"/>
           </a:p>
         </p:txBody>
@@ -1054,7 +1045,7 @@
                 <a:tabLst/>
                 <a:defRPr/>
               </a:pPr>
-              <a:t>14</a:t>
+              <a:t>11</a:t>
             </a:fld>
             <a:endParaRPr kumimoji="0" lang="it-IT" sz="1200" b="0" i="0" u="none" strike="noStrike" kern="1200" cap="none" spc="0" normalizeH="0" baseline="0" noProof="0">
               <a:ln>
@@ -1076,7 +1067,7 @@
     </p:spTree>
     <p:extLst>
       <p:ext uri="{BB962C8B-B14F-4D97-AF65-F5344CB8AC3E}">
-        <p14:creationId xmlns:p14="http://schemas.microsoft.com/office/powerpoint/2010/main" val="436950972"/>
+        <p14:creationId xmlns:p14="http://schemas.microsoft.com/office/powerpoint/2010/main" val="1909799280"/>
       </p:ext>
     </p:extLst>
   </p:cSld>
@@ -1132,7 +1123,448 @@
           <a:p>
             <a:r>
               <a:rPr lang="it-IT" dirty="0"/>
-              <a:t>L’algoritmo più lento è </a:t>
+              <a:t>Davide</a:t>
+            </a:r>
+          </a:p>
+        </p:txBody>
+      </p:sp>
+      <p:sp>
+        <p:nvSpPr>
+          <p:cNvPr id="4" name="Segnaposto numero diapositiva 3"/>
+          <p:cNvSpPr>
+            <a:spLocks noGrp="1"/>
+          </p:cNvSpPr>
+          <p:nvPr>
+            <p:ph type="sldNum" sz="quarter" idx="5"/>
+          </p:nvPr>
+        </p:nvSpPr>
+        <p:spPr/>
+        <p:txBody>
+          <a:bodyPr/>
+          <a:lstStyle/>
+          <a:p>
+            <a:pPr marL="0" marR="0" lvl="0" indent="0" algn="r" defTabSz="914400" rtl="0" eaLnBrk="1" fontAlgn="auto" latinLnBrk="0" hangingPunct="1">
+              <a:lnSpc>
+                <a:spcPct val="100000"/>
+              </a:lnSpc>
+              <a:spcBef>
+                <a:spcPts val="0"/>
+              </a:spcBef>
+              <a:spcAft>
+                <a:spcPts val="0"/>
+              </a:spcAft>
+              <a:buClrTx/>
+              <a:buSzTx/>
+              <a:buFontTx/>
+              <a:buNone/>
+              <a:tabLst/>
+              <a:defRPr/>
+            </a:pPr>
+            <a:fld id="{D5939589-3E79-4C82-AA4A-FE78234FAA59}" type="slidenum">
+              <a:rPr kumimoji="0" lang="it-IT" sz="1200" b="0" i="0" u="none" strike="noStrike" kern="1200" cap="none" spc="0" normalizeH="0" baseline="0" noProof="0" smtClean="0">
+                <a:ln>
+                  <a:noFill/>
+                </a:ln>
+                <a:solidFill>
+                  <a:prstClr val="black"/>
+                </a:solidFill>
+                <a:effectLst/>
+                <a:uLnTx/>
+                <a:uFillTx/>
+                <a:latin typeface="Calibri" panose="020F0502020204030204"/>
+                <a:ea typeface="+mn-ea"/>
+                <a:cs typeface="+mn-cs"/>
+              </a:rPr>
+              <a:pPr marL="0" marR="0" lvl="0" indent="0" algn="r" defTabSz="914400" rtl="0" eaLnBrk="1" fontAlgn="auto" latinLnBrk="0" hangingPunct="1">
+                <a:lnSpc>
+                  <a:spcPct val="100000"/>
+                </a:lnSpc>
+                <a:spcBef>
+                  <a:spcPts val="0"/>
+                </a:spcBef>
+                <a:spcAft>
+                  <a:spcPts val="0"/>
+                </a:spcAft>
+                <a:buClrTx/>
+                <a:buSzTx/>
+                <a:buFontTx/>
+                <a:buNone/>
+                <a:tabLst/>
+                <a:defRPr/>
+              </a:pPr>
+              <a:t>12</a:t>
+            </a:fld>
+            <a:endParaRPr kumimoji="0" lang="it-IT" sz="1200" b="0" i="0" u="none" strike="noStrike" kern="1200" cap="none" spc="0" normalizeH="0" baseline="0" noProof="0">
+              <a:ln>
+                <a:noFill/>
+              </a:ln>
+              <a:solidFill>
+                <a:prstClr val="black"/>
+              </a:solidFill>
+              <a:effectLst/>
+              <a:uLnTx/>
+              <a:uFillTx/>
+              <a:latin typeface="Calibri" panose="020F0502020204030204"/>
+              <a:ea typeface="+mn-ea"/>
+              <a:cs typeface="+mn-cs"/>
+            </a:endParaRPr>
+          </a:p>
+        </p:txBody>
+      </p:sp>
+    </p:spTree>
+    <p:extLst>
+      <p:ext uri="{BB962C8B-B14F-4D97-AF65-F5344CB8AC3E}">
+        <p14:creationId xmlns:p14="http://schemas.microsoft.com/office/powerpoint/2010/main" val="1794740823"/>
+      </p:ext>
+    </p:extLst>
+  </p:cSld>
+  <p:clrMapOvr>
+    <a:masterClrMapping/>
+  </p:clrMapOvr>
+</p:notes>
+</file>
+
+<file path=ppt/notesSlides/notesSlide13.xml><?xml version="1.0" encoding="utf-8"?>
+<p:notes xmlns:a="http://schemas.openxmlformats.org/drawingml/2006/main" xmlns:r="http://schemas.openxmlformats.org/officeDocument/2006/relationships" xmlns:p="http://schemas.openxmlformats.org/presentationml/2006/main">
+  <p:cSld>
+    <p:spTree>
+      <p:nvGrpSpPr>
+        <p:cNvPr id="1" name=""/>
+        <p:cNvGrpSpPr/>
+        <p:nvPr/>
+      </p:nvGrpSpPr>
+      <p:grpSpPr>
+        <a:xfrm>
+          <a:off x="0" y="0"/>
+          <a:ext cx="0" cy="0"/>
+          <a:chOff x="0" y="0"/>
+          <a:chExt cx="0" cy="0"/>
+        </a:xfrm>
+      </p:grpSpPr>
+      <p:sp>
+        <p:nvSpPr>
+          <p:cNvPr id="2" name="Segnaposto immagine diapositiva 1"/>
+          <p:cNvSpPr>
+            <a:spLocks noGrp="1" noRot="1" noChangeAspect="1"/>
+          </p:cNvSpPr>
+          <p:nvPr>
+            <p:ph type="sldImg"/>
+          </p:nvPr>
+        </p:nvSpPr>
+        <p:spPr/>
+      </p:sp>
+      <p:sp>
+        <p:nvSpPr>
+          <p:cNvPr id="3" name="Segnaposto note 2"/>
+          <p:cNvSpPr>
+            <a:spLocks noGrp="1"/>
+          </p:cNvSpPr>
+          <p:nvPr>
+            <p:ph type="body" idx="1"/>
+          </p:nvPr>
+        </p:nvSpPr>
+        <p:spPr/>
+        <p:txBody>
+          <a:bodyPr/>
+          <a:lstStyle/>
+          <a:p>
+            <a:r>
+              <a:rPr lang="it-IT" dirty="0"/>
+              <a:t>Matteo: Notare il tempo di esecuzione!!</a:t>
+            </a:r>
+          </a:p>
+        </p:txBody>
+      </p:sp>
+      <p:sp>
+        <p:nvSpPr>
+          <p:cNvPr id="4" name="Segnaposto numero diapositiva 3"/>
+          <p:cNvSpPr>
+            <a:spLocks noGrp="1"/>
+          </p:cNvSpPr>
+          <p:nvPr>
+            <p:ph type="sldNum" sz="quarter" idx="5"/>
+          </p:nvPr>
+        </p:nvSpPr>
+        <p:spPr/>
+        <p:txBody>
+          <a:bodyPr/>
+          <a:lstStyle/>
+          <a:p>
+            <a:pPr marL="0" marR="0" lvl="0" indent="0" algn="r" defTabSz="914400" rtl="0" eaLnBrk="1" fontAlgn="auto" latinLnBrk="0" hangingPunct="1">
+              <a:lnSpc>
+                <a:spcPct val="100000"/>
+              </a:lnSpc>
+              <a:spcBef>
+                <a:spcPts val="0"/>
+              </a:spcBef>
+              <a:spcAft>
+                <a:spcPts val="0"/>
+              </a:spcAft>
+              <a:buClrTx/>
+              <a:buSzTx/>
+              <a:buFontTx/>
+              <a:buNone/>
+              <a:tabLst/>
+              <a:defRPr/>
+            </a:pPr>
+            <a:fld id="{D5939589-3E79-4C82-AA4A-FE78234FAA59}" type="slidenum">
+              <a:rPr kumimoji="0" lang="it-IT" sz="1200" b="0" i="0" u="none" strike="noStrike" kern="1200" cap="none" spc="0" normalizeH="0" baseline="0" noProof="0" smtClean="0">
+                <a:ln>
+                  <a:noFill/>
+                </a:ln>
+                <a:solidFill>
+                  <a:prstClr val="black"/>
+                </a:solidFill>
+                <a:effectLst/>
+                <a:uLnTx/>
+                <a:uFillTx/>
+                <a:latin typeface="Calibri" panose="020F0502020204030204"/>
+                <a:ea typeface="+mn-ea"/>
+                <a:cs typeface="+mn-cs"/>
+              </a:rPr>
+              <a:pPr marL="0" marR="0" lvl="0" indent="0" algn="r" defTabSz="914400" rtl="0" eaLnBrk="1" fontAlgn="auto" latinLnBrk="0" hangingPunct="1">
+                <a:lnSpc>
+                  <a:spcPct val="100000"/>
+                </a:lnSpc>
+                <a:spcBef>
+                  <a:spcPts val="0"/>
+                </a:spcBef>
+                <a:spcAft>
+                  <a:spcPts val="0"/>
+                </a:spcAft>
+                <a:buClrTx/>
+                <a:buSzTx/>
+                <a:buFontTx/>
+                <a:buNone/>
+                <a:tabLst/>
+                <a:defRPr/>
+              </a:pPr>
+              <a:t>13</a:t>
+            </a:fld>
+            <a:endParaRPr kumimoji="0" lang="it-IT" sz="1200" b="0" i="0" u="none" strike="noStrike" kern="1200" cap="none" spc="0" normalizeH="0" baseline="0" noProof="0">
+              <a:ln>
+                <a:noFill/>
+              </a:ln>
+              <a:solidFill>
+                <a:prstClr val="black"/>
+              </a:solidFill>
+              <a:effectLst/>
+              <a:uLnTx/>
+              <a:uFillTx/>
+              <a:latin typeface="Calibri" panose="020F0502020204030204"/>
+              <a:ea typeface="+mn-ea"/>
+              <a:cs typeface="+mn-cs"/>
+            </a:endParaRPr>
+          </a:p>
+        </p:txBody>
+      </p:sp>
+    </p:spTree>
+    <p:extLst>
+      <p:ext uri="{BB962C8B-B14F-4D97-AF65-F5344CB8AC3E}">
+        <p14:creationId xmlns:p14="http://schemas.microsoft.com/office/powerpoint/2010/main" val="336771124"/>
+      </p:ext>
+    </p:extLst>
+  </p:cSld>
+  <p:clrMapOvr>
+    <a:masterClrMapping/>
+  </p:clrMapOvr>
+</p:notes>
+</file>
+
+<file path=ppt/notesSlides/notesSlide14.xml><?xml version="1.0" encoding="utf-8"?>
+<p:notes xmlns:a="http://schemas.openxmlformats.org/drawingml/2006/main" xmlns:r="http://schemas.openxmlformats.org/officeDocument/2006/relationships" xmlns:p="http://schemas.openxmlformats.org/presentationml/2006/main">
+  <p:cSld>
+    <p:spTree>
+      <p:nvGrpSpPr>
+        <p:cNvPr id="1" name=""/>
+        <p:cNvGrpSpPr/>
+        <p:nvPr/>
+      </p:nvGrpSpPr>
+      <p:grpSpPr>
+        <a:xfrm>
+          <a:off x="0" y="0"/>
+          <a:ext cx="0" cy="0"/>
+          <a:chOff x="0" y="0"/>
+          <a:chExt cx="0" cy="0"/>
+        </a:xfrm>
+      </p:grpSpPr>
+      <p:sp>
+        <p:nvSpPr>
+          <p:cNvPr id="2" name="Segnaposto immagine diapositiva 1"/>
+          <p:cNvSpPr>
+            <a:spLocks noGrp="1" noRot="1" noChangeAspect="1"/>
+          </p:cNvSpPr>
+          <p:nvPr>
+            <p:ph type="sldImg"/>
+          </p:nvPr>
+        </p:nvSpPr>
+        <p:spPr/>
+      </p:sp>
+      <p:sp>
+        <p:nvSpPr>
+          <p:cNvPr id="3" name="Segnaposto note 2"/>
+          <p:cNvSpPr>
+            <a:spLocks noGrp="1"/>
+          </p:cNvSpPr>
+          <p:nvPr>
+            <p:ph type="body" idx="1"/>
+          </p:nvPr>
+        </p:nvSpPr>
+        <p:spPr/>
+        <p:txBody>
+          <a:bodyPr/>
+          <a:lstStyle/>
+          <a:p>
+            <a:r>
+              <a:rPr lang="it-IT" dirty="0"/>
+              <a:t>Matteo</a:t>
+            </a:r>
+          </a:p>
+        </p:txBody>
+      </p:sp>
+      <p:sp>
+        <p:nvSpPr>
+          <p:cNvPr id="4" name="Segnaposto numero diapositiva 3"/>
+          <p:cNvSpPr>
+            <a:spLocks noGrp="1"/>
+          </p:cNvSpPr>
+          <p:nvPr>
+            <p:ph type="sldNum" sz="quarter" idx="5"/>
+          </p:nvPr>
+        </p:nvSpPr>
+        <p:spPr/>
+        <p:txBody>
+          <a:bodyPr/>
+          <a:lstStyle/>
+          <a:p>
+            <a:pPr marL="0" marR="0" lvl="0" indent="0" algn="r" defTabSz="914400" rtl="0" eaLnBrk="1" fontAlgn="auto" latinLnBrk="0" hangingPunct="1">
+              <a:lnSpc>
+                <a:spcPct val="100000"/>
+              </a:lnSpc>
+              <a:spcBef>
+                <a:spcPts val="0"/>
+              </a:spcBef>
+              <a:spcAft>
+                <a:spcPts val="0"/>
+              </a:spcAft>
+              <a:buClrTx/>
+              <a:buSzTx/>
+              <a:buFontTx/>
+              <a:buNone/>
+              <a:tabLst/>
+              <a:defRPr/>
+            </a:pPr>
+            <a:fld id="{D5939589-3E79-4C82-AA4A-FE78234FAA59}" type="slidenum">
+              <a:rPr kumimoji="0" lang="it-IT" sz="1200" b="0" i="0" u="none" strike="noStrike" kern="1200" cap="none" spc="0" normalizeH="0" baseline="0" noProof="0" smtClean="0">
+                <a:ln>
+                  <a:noFill/>
+                </a:ln>
+                <a:solidFill>
+                  <a:prstClr val="black"/>
+                </a:solidFill>
+                <a:effectLst/>
+                <a:uLnTx/>
+                <a:uFillTx/>
+                <a:latin typeface="Calibri" panose="020F0502020204030204"/>
+                <a:ea typeface="+mn-ea"/>
+                <a:cs typeface="+mn-cs"/>
+              </a:rPr>
+              <a:pPr marL="0" marR="0" lvl="0" indent="0" algn="r" defTabSz="914400" rtl="0" eaLnBrk="1" fontAlgn="auto" latinLnBrk="0" hangingPunct="1">
+                <a:lnSpc>
+                  <a:spcPct val="100000"/>
+                </a:lnSpc>
+                <a:spcBef>
+                  <a:spcPts val="0"/>
+                </a:spcBef>
+                <a:spcAft>
+                  <a:spcPts val="0"/>
+                </a:spcAft>
+                <a:buClrTx/>
+                <a:buSzTx/>
+                <a:buFontTx/>
+                <a:buNone/>
+                <a:tabLst/>
+                <a:defRPr/>
+              </a:pPr>
+              <a:t>14</a:t>
+            </a:fld>
+            <a:endParaRPr kumimoji="0" lang="it-IT" sz="1200" b="0" i="0" u="none" strike="noStrike" kern="1200" cap="none" spc="0" normalizeH="0" baseline="0" noProof="0">
+              <a:ln>
+                <a:noFill/>
+              </a:ln>
+              <a:solidFill>
+                <a:prstClr val="black"/>
+              </a:solidFill>
+              <a:effectLst/>
+              <a:uLnTx/>
+              <a:uFillTx/>
+              <a:latin typeface="Calibri" panose="020F0502020204030204"/>
+              <a:ea typeface="+mn-ea"/>
+              <a:cs typeface="+mn-cs"/>
+            </a:endParaRPr>
+          </a:p>
+        </p:txBody>
+      </p:sp>
+    </p:spTree>
+    <p:extLst>
+      <p:ext uri="{BB962C8B-B14F-4D97-AF65-F5344CB8AC3E}">
+        <p14:creationId xmlns:p14="http://schemas.microsoft.com/office/powerpoint/2010/main" val="436950972"/>
+      </p:ext>
+    </p:extLst>
+  </p:cSld>
+  <p:clrMapOvr>
+    <a:masterClrMapping/>
+  </p:clrMapOvr>
+</p:notes>
+</file>
+
+<file path=ppt/notesSlides/notesSlide15.xml><?xml version="1.0" encoding="utf-8"?>
+<p:notes xmlns:a="http://schemas.openxmlformats.org/drawingml/2006/main" xmlns:r="http://schemas.openxmlformats.org/officeDocument/2006/relationships" xmlns:p="http://schemas.openxmlformats.org/presentationml/2006/main">
+  <p:cSld>
+    <p:spTree>
+      <p:nvGrpSpPr>
+        <p:cNvPr id="1" name=""/>
+        <p:cNvGrpSpPr/>
+        <p:nvPr/>
+      </p:nvGrpSpPr>
+      <p:grpSpPr>
+        <a:xfrm>
+          <a:off x="0" y="0"/>
+          <a:ext cx="0" cy="0"/>
+          <a:chOff x="0" y="0"/>
+          <a:chExt cx="0" cy="0"/>
+        </a:xfrm>
+      </p:grpSpPr>
+      <p:sp>
+        <p:nvSpPr>
+          <p:cNvPr id="2" name="Segnaposto immagine diapositiva 1"/>
+          <p:cNvSpPr>
+            <a:spLocks noGrp="1" noRot="1" noChangeAspect="1"/>
+          </p:cNvSpPr>
+          <p:nvPr>
+            <p:ph type="sldImg"/>
+          </p:nvPr>
+        </p:nvSpPr>
+        <p:spPr/>
+      </p:sp>
+      <p:sp>
+        <p:nvSpPr>
+          <p:cNvPr id="3" name="Segnaposto note 2"/>
+          <p:cNvSpPr>
+            <a:spLocks noGrp="1"/>
+          </p:cNvSpPr>
+          <p:nvPr>
+            <p:ph type="body" idx="1"/>
+          </p:nvPr>
+        </p:nvSpPr>
+        <p:spPr/>
+        <p:txBody>
+          <a:bodyPr/>
+          <a:lstStyle/>
+          <a:p>
+            <a:r>
+              <a:rPr lang="it-IT" dirty="0"/>
+              <a:t>Matteo: L’algoritmo più lento è </a:t>
             </a:r>
             <a:r>
               <a:rPr lang="it-IT" dirty="0" err="1"/>
@@ -1293,7 +1725,10 @@
           <a:bodyPr/>
           <a:lstStyle/>
           <a:p>
-            <a:endParaRPr lang="it-IT" dirty="0"/>
+            <a:r>
+              <a:rPr lang="it-IT" dirty="0"/>
+              <a:t>Matteo</a:t>
+            </a:r>
           </a:p>
         </p:txBody>
       </p:sp>
@@ -1315,7 +1750,7 @@
             <a:pPr rtl="0"/>
             <a:fld id="{D5939589-3E79-4C82-AA4A-FE78234FAA59}" type="slidenum">
               <a:rPr lang="it-IT" noProof="0" smtClean="0"/>
-              <a:t>5</a:t>
+              <a:t>2</a:t>
             </a:fld>
             <a:endParaRPr lang="it-IT" noProof="0"/>
           </a:p>
@@ -1324,7 +1759,7 @@
     </p:spTree>
     <p:extLst>
       <p:ext uri="{BB962C8B-B14F-4D97-AF65-F5344CB8AC3E}">
-        <p14:creationId xmlns:p14="http://schemas.microsoft.com/office/powerpoint/2010/main" val="3636227065"/>
+        <p14:creationId xmlns:p14="http://schemas.microsoft.com/office/powerpoint/2010/main" val="3726392934"/>
       </p:ext>
     </p:extLst>
   </p:cSld>
@@ -1380,7 +1815,7 @@
           <a:p>
             <a:r>
               <a:rPr lang="it-IT" dirty="0"/>
-              <a:t>Notare come fascia 18 anni + fumatori maschi mentre nel caso dei 64 anni + fumatrici femmine</a:t>
+              <a:t>Matteo</a:t>
             </a:r>
           </a:p>
         </p:txBody>
@@ -1403,7 +1838,7 @@
             <a:pPr rtl="0"/>
             <a:fld id="{D5939589-3E79-4C82-AA4A-FE78234FAA59}" type="slidenum">
               <a:rPr lang="it-IT" noProof="0" smtClean="0"/>
-              <a:t>6</a:t>
+              <a:t>3</a:t>
             </a:fld>
             <a:endParaRPr lang="it-IT" noProof="0"/>
           </a:p>
@@ -1412,7 +1847,7 @@
     </p:spTree>
     <p:extLst>
       <p:ext uri="{BB962C8B-B14F-4D97-AF65-F5344CB8AC3E}">
-        <p14:creationId xmlns:p14="http://schemas.microsoft.com/office/powerpoint/2010/main" val="3996087410"/>
+        <p14:creationId xmlns:p14="http://schemas.microsoft.com/office/powerpoint/2010/main" val="991953087"/>
       </p:ext>
     </p:extLst>
   </p:cSld>
@@ -1468,23 +1903,7 @@
           <a:p>
             <a:r>
               <a:rPr lang="it-IT" dirty="0"/>
-              <a:t>Notare come </a:t>
-            </a:r>
-            <a:r>
-              <a:rPr lang="it-IT" dirty="0" err="1"/>
-              <a:t>come</a:t>
-            </a:r>
-            <a:r>
-              <a:rPr lang="it-IT" dirty="0"/>
-              <a:t> ci sia il picco della distribuzione con il </a:t>
-            </a:r>
-            <a:r>
-              <a:rPr lang="it-IT" dirty="0" err="1"/>
-              <a:t>bmi</a:t>
-            </a:r>
-            <a:r>
-              <a:rPr lang="it-IT" dirty="0"/>
-              <a:t> =30</a:t>
+              <a:t>Matteo</a:t>
             </a:r>
           </a:p>
         </p:txBody>
@@ -1507,7 +1926,7 @@
             <a:pPr rtl="0"/>
             <a:fld id="{D5939589-3E79-4C82-AA4A-FE78234FAA59}" type="slidenum">
               <a:rPr lang="it-IT" noProof="0" smtClean="0"/>
-              <a:t>7</a:t>
+              <a:t>4</a:t>
             </a:fld>
             <a:endParaRPr lang="it-IT" noProof="0"/>
           </a:p>
@@ -1516,7 +1935,7 @@
     </p:spTree>
     <p:extLst>
       <p:ext uri="{BB962C8B-B14F-4D97-AF65-F5344CB8AC3E}">
-        <p14:creationId xmlns:p14="http://schemas.microsoft.com/office/powerpoint/2010/main" val="2102171001"/>
+        <p14:creationId xmlns:p14="http://schemas.microsoft.com/office/powerpoint/2010/main" val="2551888477"/>
       </p:ext>
     </p:extLst>
   </p:cSld>
@@ -1570,7 +1989,10 @@
           <a:bodyPr/>
           <a:lstStyle/>
           <a:p>
-            <a:endParaRPr lang="it-IT" dirty="0"/>
+            <a:r>
+              <a:rPr lang="it-IT" dirty="0"/>
+              <a:t>Matteo</a:t>
+            </a:r>
           </a:p>
         </p:txBody>
       </p:sp>
@@ -1592,7 +2014,7 @@
             <a:pPr rtl="0"/>
             <a:fld id="{D5939589-3E79-4C82-AA4A-FE78234FAA59}" type="slidenum">
               <a:rPr lang="it-IT" noProof="0" smtClean="0"/>
-              <a:t>8</a:t>
+              <a:t>5</a:t>
             </a:fld>
             <a:endParaRPr lang="it-IT" noProof="0"/>
           </a:p>
@@ -1601,7 +2023,7 @@
     </p:spTree>
     <p:extLst>
       <p:ext uri="{BB962C8B-B14F-4D97-AF65-F5344CB8AC3E}">
-        <p14:creationId xmlns:p14="http://schemas.microsoft.com/office/powerpoint/2010/main" val="2545477520"/>
+        <p14:creationId xmlns:p14="http://schemas.microsoft.com/office/powerpoint/2010/main" val="3636227065"/>
       </p:ext>
     </p:extLst>
   </p:cSld>
@@ -1657,15 +2079,7 @@
           <a:p>
             <a:r>
               <a:rPr lang="it-IT" dirty="0"/>
-              <a:t>In media i non fumatori, qualsiasi sia il loro BMI, spendono intorno ai 10000 (soprattutto fino ad un BMI intorno ai 35). Si vede invece che i fumatori, anche con un BMI basso, spendono di più. Questo dato si incrementa quando il BMI supera 30. Abbiamo deciso di inserire nello </a:t>
-            </a:r>
-            <a:r>
-              <a:rPr lang="it-IT" dirty="0" err="1"/>
-              <a:t>scatter</a:t>
-            </a:r>
-            <a:r>
-              <a:rPr lang="it-IT" dirty="0"/>
-              <a:t> plot tutto quello che abbiamo viso n precedenza</a:t>
+              <a:t>Matteo: Notare come fascia 18 anni + fumatori maschi mentre nel caso dei 64 anni + fumatrici femmine</a:t>
             </a:r>
           </a:p>
         </p:txBody>
@@ -1688,7 +2102,7 @@
             <a:pPr rtl="0"/>
             <a:fld id="{D5939589-3E79-4C82-AA4A-FE78234FAA59}" type="slidenum">
               <a:rPr lang="it-IT" noProof="0" smtClean="0"/>
-              <a:t>9</a:t>
+              <a:t>6</a:t>
             </a:fld>
             <a:endParaRPr lang="it-IT" noProof="0"/>
           </a:p>
@@ -1697,7 +2111,7 @@
     </p:spTree>
     <p:extLst>
       <p:ext uri="{BB962C8B-B14F-4D97-AF65-F5344CB8AC3E}">
-        <p14:creationId xmlns:p14="http://schemas.microsoft.com/office/powerpoint/2010/main" val="2627523483"/>
+        <p14:creationId xmlns:p14="http://schemas.microsoft.com/office/powerpoint/2010/main" val="3996087410"/>
       </p:ext>
     </p:extLst>
   </p:cSld>
@@ -1753,37 +2167,24 @@
           <a:p>
             <a:r>
               <a:rPr lang="it-IT" dirty="0"/>
-              <a:t>10 </a:t>
+              <a:t>Davide: Notare come </a:t>
             </a:r>
             <a:r>
               <a:rPr lang="it-IT" dirty="0" err="1"/>
-              <a:t>fold</a:t>
+              <a:t>come</a:t>
             </a:r>
             <a:r>
               <a:rPr lang="it-IT" dirty="0"/>
-              <a:t>-cross </a:t>
+              <a:t> ci sia il picco della distribuzione con il </a:t>
             </a:r>
             <a:r>
               <a:rPr lang="it-IT" dirty="0" err="1"/>
-              <a:t>validation</a:t>
+              <a:t>bmi</a:t>
             </a:r>
             <a:r>
               <a:rPr lang="it-IT" dirty="0"/>
-              <a:t> </a:t>
-            </a:r>
-            <a:r>
-              <a:rPr lang="it-IT" dirty="0">
-                <a:sym typeface="Wingdings" panose="05000000000000000000" pitchFamily="2" charset="2"/>
-              </a:rPr>
-              <a:t> 9 test e 1 </a:t>
-            </a:r>
-            <a:r>
-              <a:rPr lang="it-IT" dirty="0" err="1">
-                <a:sym typeface="Wingdings" panose="05000000000000000000" pitchFamily="2" charset="2"/>
-              </a:rPr>
-              <a:t>validation</a:t>
-            </a:r>
-            <a:endParaRPr lang="it-IT" dirty="0"/>
+              <a:t> =30</a:t>
+            </a:r>
           </a:p>
         </p:txBody>
       </p:sp>
@@ -1805,7 +2206,7 @@
             <a:pPr rtl="0"/>
             <a:fld id="{D5939589-3E79-4C82-AA4A-FE78234FAA59}" type="slidenum">
               <a:rPr lang="it-IT" noProof="0" smtClean="0"/>
-              <a:t>10</a:t>
+              <a:t>7</a:t>
             </a:fld>
             <a:endParaRPr lang="it-IT" noProof="0"/>
           </a:p>
@@ -1814,7 +2215,7 @@
     </p:spTree>
     <p:extLst>
       <p:ext uri="{BB962C8B-B14F-4D97-AF65-F5344CB8AC3E}">
-        <p14:creationId xmlns:p14="http://schemas.microsoft.com/office/powerpoint/2010/main" val="1151121713"/>
+        <p14:creationId xmlns:p14="http://schemas.microsoft.com/office/powerpoint/2010/main" val="2102171001"/>
       </p:ext>
     </p:extLst>
   </p:cSld>
@@ -1870,23 +2271,8 @@
           <a:p>
             <a:r>
               <a:rPr lang="it-IT" dirty="0"/>
-              <a:t>R^2 (coefficiente di determinazione) parametro </a:t>
-            </a:r>
-            <a:r>
-              <a:rPr lang="it-IT" dirty="0" err="1"/>
-              <a:t>Accuracy</a:t>
-            </a:r>
-            <a:r>
-              <a:rPr lang="it-IT" dirty="0"/>
-              <a:t> </a:t>
-            </a:r>
-            <a:r>
-              <a:rPr lang="it-IT" dirty="0">
-                <a:sym typeface="Wingdings" panose="05000000000000000000" pitchFamily="2" charset="2"/>
-              </a:rPr>
-              <a:t> quanto è precisa la predizione effettuata R=1  valori predetti = reali, R=0 valori predetti = media di tutti i valori di y, R &lt; 0 =modello errato.</a:t>
-            </a:r>
-            <a:endParaRPr lang="it-IT" dirty="0"/>
+              <a:t>Davide</a:t>
+            </a:r>
           </a:p>
         </p:txBody>
       </p:sp>
@@ -1905,78 +2291,19 @@
           <a:bodyPr/>
           <a:lstStyle/>
           <a:p>
-            <a:pPr marL="0" marR="0" lvl="0" indent="0" algn="r" defTabSz="914400" rtl="0" eaLnBrk="1" fontAlgn="auto" latinLnBrk="0" hangingPunct="1">
-              <a:lnSpc>
-                <a:spcPct val="100000"/>
-              </a:lnSpc>
-              <a:spcBef>
-                <a:spcPts val="0"/>
-              </a:spcBef>
-              <a:spcAft>
-                <a:spcPts val="0"/>
-              </a:spcAft>
-              <a:buClrTx/>
-              <a:buSzTx/>
-              <a:buFontTx/>
-              <a:buNone/>
-              <a:tabLst/>
-              <a:defRPr/>
-            </a:pPr>
+            <a:pPr rtl="0"/>
             <a:fld id="{D5939589-3E79-4C82-AA4A-FE78234FAA59}" type="slidenum">
-              <a:rPr kumimoji="0" lang="it-IT" sz="1200" b="0" i="0" u="none" strike="noStrike" kern="1200" cap="none" spc="0" normalizeH="0" baseline="0" noProof="0" smtClean="0">
-                <a:ln>
-                  <a:noFill/>
-                </a:ln>
-                <a:solidFill>
-                  <a:prstClr val="black"/>
-                </a:solidFill>
-                <a:effectLst/>
-                <a:uLnTx/>
-                <a:uFillTx/>
-                <a:latin typeface="Calibri" panose="020F0502020204030204"/>
-                <a:ea typeface="+mn-ea"/>
-                <a:cs typeface="+mn-cs"/>
-              </a:rPr>
-              <a:pPr marL="0" marR="0" lvl="0" indent="0" algn="r" defTabSz="914400" rtl="0" eaLnBrk="1" fontAlgn="auto" latinLnBrk="0" hangingPunct="1">
-                <a:lnSpc>
-                  <a:spcPct val="100000"/>
-                </a:lnSpc>
-                <a:spcBef>
-                  <a:spcPts val="0"/>
-                </a:spcBef>
-                <a:spcAft>
-                  <a:spcPts val="0"/>
-                </a:spcAft>
-                <a:buClrTx/>
-                <a:buSzTx/>
-                <a:buFontTx/>
-                <a:buNone/>
-                <a:tabLst/>
-                <a:defRPr/>
-              </a:pPr>
-              <a:t>11</a:t>
+              <a:rPr lang="it-IT" noProof="0" smtClean="0"/>
+              <a:t>8</a:t>
             </a:fld>
-            <a:endParaRPr kumimoji="0" lang="it-IT" sz="1200" b="0" i="0" u="none" strike="noStrike" kern="1200" cap="none" spc="0" normalizeH="0" baseline="0" noProof="0">
-              <a:ln>
-                <a:noFill/>
-              </a:ln>
-              <a:solidFill>
-                <a:prstClr val="black"/>
-              </a:solidFill>
-              <a:effectLst/>
-              <a:uLnTx/>
-              <a:uFillTx/>
-              <a:latin typeface="Calibri" panose="020F0502020204030204"/>
-              <a:ea typeface="+mn-ea"/>
-              <a:cs typeface="+mn-cs"/>
-            </a:endParaRPr>
+            <a:endParaRPr lang="it-IT" noProof="0"/>
           </a:p>
         </p:txBody>
       </p:sp>
     </p:spTree>
     <p:extLst>
       <p:ext uri="{BB962C8B-B14F-4D97-AF65-F5344CB8AC3E}">
-        <p14:creationId xmlns:p14="http://schemas.microsoft.com/office/powerpoint/2010/main" val="1909799280"/>
+        <p14:creationId xmlns:p14="http://schemas.microsoft.com/office/powerpoint/2010/main" val="2545477520"/>
       </p:ext>
     </p:extLst>
   </p:cSld>
@@ -2030,7 +2357,18 @@
           <a:bodyPr/>
           <a:lstStyle/>
           <a:p>
-            <a:endParaRPr lang="it-IT" dirty="0"/>
+            <a:r>
+              <a:rPr lang="it-IT" dirty="0"/>
+              <a:t>Davide: In media i non fumatori, qualsiasi sia il loro BMI, spendono intorno ai 10000 (soprattutto fino ad un BMI intorno ai 35). Si vede invece che i fumatori, anche con un BMI basso, spendono di più. Questo dato si incrementa quando il BMI supera 30. Abbiamo deciso di inserire nello </a:t>
+            </a:r>
+            <a:r>
+              <a:rPr lang="it-IT" dirty="0" err="1"/>
+              <a:t>scatter</a:t>
+            </a:r>
+            <a:r>
+              <a:rPr lang="it-IT" dirty="0"/>
+              <a:t> plot tutto quello che abbiamo viso n precedenza</a:t>
+            </a:r>
           </a:p>
         </p:txBody>
       </p:sp>
@@ -2049,78 +2387,19 @@
           <a:bodyPr/>
           <a:lstStyle/>
           <a:p>
-            <a:pPr marL="0" marR="0" lvl="0" indent="0" algn="r" defTabSz="914400" rtl="0" eaLnBrk="1" fontAlgn="auto" latinLnBrk="0" hangingPunct="1">
-              <a:lnSpc>
-                <a:spcPct val="100000"/>
-              </a:lnSpc>
-              <a:spcBef>
-                <a:spcPts val="0"/>
-              </a:spcBef>
-              <a:spcAft>
-                <a:spcPts val="0"/>
-              </a:spcAft>
-              <a:buClrTx/>
-              <a:buSzTx/>
-              <a:buFontTx/>
-              <a:buNone/>
-              <a:tabLst/>
-              <a:defRPr/>
-            </a:pPr>
+            <a:pPr rtl="0"/>
             <a:fld id="{D5939589-3E79-4C82-AA4A-FE78234FAA59}" type="slidenum">
-              <a:rPr kumimoji="0" lang="it-IT" sz="1200" b="0" i="0" u="none" strike="noStrike" kern="1200" cap="none" spc="0" normalizeH="0" baseline="0" noProof="0" smtClean="0">
-                <a:ln>
-                  <a:noFill/>
-                </a:ln>
-                <a:solidFill>
-                  <a:prstClr val="black"/>
-                </a:solidFill>
-                <a:effectLst/>
-                <a:uLnTx/>
-                <a:uFillTx/>
-                <a:latin typeface="Calibri" panose="020F0502020204030204"/>
-                <a:ea typeface="+mn-ea"/>
-                <a:cs typeface="+mn-cs"/>
-              </a:rPr>
-              <a:pPr marL="0" marR="0" lvl="0" indent="0" algn="r" defTabSz="914400" rtl="0" eaLnBrk="1" fontAlgn="auto" latinLnBrk="0" hangingPunct="1">
-                <a:lnSpc>
-                  <a:spcPct val="100000"/>
-                </a:lnSpc>
-                <a:spcBef>
-                  <a:spcPts val="0"/>
-                </a:spcBef>
-                <a:spcAft>
-                  <a:spcPts val="0"/>
-                </a:spcAft>
-                <a:buClrTx/>
-                <a:buSzTx/>
-                <a:buFontTx/>
-                <a:buNone/>
-                <a:tabLst/>
-                <a:defRPr/>
-              </a:pPr>
-              <a:t>12</a:t>
+              <a:rPr lang="it-IT" noProof="0" smtClean="0"/>
+              <a:t>9</a:t>
             </a:fld>
-            <a:endParaRPr kumimoji="0" lang="it-IT" sz="1200" b="0" i="0" u="none" strike="noStrike" kern="1200" cap="none" spc="0" normalizeH="0" baseline="0" noProof="0">
-              <a:ln>
-                <a:noFill/>
-              </a:ln>
-              <a:solidFill>
-                <a:prstClr val="black"/>
-              </a:solidFill>
-              <a:effectLst/>
-              <a:uLnTx/>
-              <a:uFillTx/>
-              <a:latin typeface="Calibri" panose="020F0502020204030204"/>
-              <a:ea typeface="+mn-ea"/>
-              <a:cs typeface="+mn-cs"/>
-            </a:endParaRPr>
+            <a:endParaRPr lang="it-IT" noProof="0"/>
           </a:p>
         </p:txBody>
       </p:sp>
     </p:spTree>
     <p:extLst>
       <p:ext uri="{BB962C8B-B14F-4D97-AF65-F5344CB8AC3E}">
-        <p14:creationId xmlns:p14="http://schemas.microsoft.com/office/powerpoint/2010/main" val="1794740823"/>
+        <p14:creationId xmlns:p14="http://schemas.microsoft.com/office/powerpoint/2010/main" val="2627523483"/>
       </p:ext>
     </p:extLst>
   </p:cSld>
@@ -18701,7 +18980,7 @@
           <p:nvPr/>
         </p:nvPicPr>
         <p:blipFill>
-          <a:blip r:embed="rId2"/>
+          <a:blip r:embed="rId3"/>
           <a:stretch>
             <a:fillRect/>
           </a:stretch>
@@ -18909,7 +19188,7 @@
           <p:nvPr/>
         </p:nvPicPr>
         <p:blipFill>
-          <a:blip r:embed="rId2"/>
+          <a:blip r:embed="rId3"/>
           <a:stretch>
             <a:fillRect/>
           </a:stretch>
@@ -18939,7 +19218,7 @@
           <p:nvPr/>
         </p:nvPicPr>
         <p:blipFill>
-          <a:blip r:embed="rId3"/>
+          <a:blip r:embed="rId4"/>
           <a:stretch>
             <a:fillRect/>
           </a:stretch>
@@ -21971,15 +22250,6 @@
 </file>
 
 <file path=customXml/item1.xml><?xml version="1.0" encoding="utf-8"?>
-<p:properties xmlns:p="http://schemas.microsoft.com/office/2006/metadata/properties" xmlns:xsi="http://www.w3.org/2001/XMLSchema-instance" xmlns:pc="http://schemas.microsoft.com/office/infopath/2007/PartnerControls">
-  <documentManagement>
-    <Status xmlns="71af3243-3dd4-4a8d-8c0d-dd76da1f02a5">Not started</Status>
-    <MediaServiceKeyPoints xmlns="71af3243-3dd4-4a8d-8c0d-dd76da1f02a5" xsi:nil="true"/>
-  </documentManagement>
-</p:properties>
-</file>
-
-<file path=customXml/item2.xml><?xml version="1.0" encoding="utf-8"?>
 <ct:contentTypeSchema xmlns:ct="http://schemas.microsoft.com/office/2006/metadata/contentType" xmlns:ma="http://schemas.microsoft.com/office/2006/metadata/properties/metaAttributes" ct:_="" ma:_="" ma:contentTypeName="Document" ma:contentTypeID="0x01010079F111ED35F8CC479449609E8A0923A6" ma:contentTypeVersion="12" ma:contentTypeDescription="Create a new document." ma:contentTypeScope="" ma:versionID="426e97fa315356fffbdcd9876fe988c2">
   <xsd:schema xmlns:xsd="http://www.w3.org/2001/XMLSchema" xmlns:xs="http://www.w3.org/2001/XMLSchema" xmlns:p="http://schemas.microsoft.com/office/2006/metadata/properties" xmlns:ns2="71af3243-3dd4-4a8d-8c0d-dd76da1f02a5" xmlns:ns3="16c05727-aa75-4e4a-9b5f-8a80a1165891" targetNamespace="http://schemas.microsoft.com/office/2006/metadata/properties" ma:root="true" ma:fieldsID="14b8f0def80e6d70ce3def20c90759ae" ns2:_="" ns3:_="">
     <xsd:import namespace="71af3243-3dd4-4a8d-8c0d-dd76da1f02a5"/>
@@ -22200,6 +22470,15 @@
 </ct:contentTypeSchema>
 </file>
 
+<file path=customXml/item2.xml><?xml version="1.0" encoding="utf-8"?>
+<p:properties xmlns:p="http://schemas.microsoft.com/office/2006/metadata/properties" xmlns:xsi="http://www.w3.org/2001/XMLSchema-instance" xmlns:pc="http://schemas.microsoft.com/office/infopath/2007/PartnerControls">
+  <documentManagement>
+    <Status xmlns="71af3243-3dd4-4a8d-8c0d-dd76da1f02a5">Not started</Status>
+    <MediaServiceKeyPoints xmlns="71af3243-3dd4-4a8d-8c0d-dd76da1f02a5" xsi:nil="true"/>
+  </documentManagement>
+</p:properties>
+</file>
+
 <file path=customXml/item3.xml><?xml version="1.0" encoding="utf-8"?>
 <?mso-contentType ?>
 <FormTemplates xmlns="http://schemas.microsoft.com/sharepoint/v3/contenttype/forms">
@@ -22210,16 +22489,6 @@
 </file>
 
 <file path=customXml/itemProps1.xml><?xml version="1.0" encoding="utf-8"?>
-<ds:datastoreItem xmlns:ds="http://schemas.openxmlformats.org/officeDocument/2006/customXml" ds:itemID="{99919F73-B6C2-4A43-95E2-833EC48925FE}">
-  <ds:schemaRefs>
-    <ds:schemaRef ds:uri="http://schemas.microsoft.com/office/2006/metadata/properties"/>
-    <ds:schemaRef ds:uri="http://schemas.microsoft.com/office/infopath/2007/PartnerControls"/>
-    <ds:schemaRef ds:uri="71af3243-3dd4-4a8d-8c0d-dd76da1f02a5"/>
-  </ds:schemaRefs>
-</ds:datastoreItem>
-</file>
-
-<file path=customXml/itemProps2.xml><?xml version="1.0" encoding="utf-8"?>
 <ds:datastoreItem xmlns:ds="http://schemas.openxmlformats.org/officeDocument/2006/customXml" ds:itemID="{ABC329F5-30EE-4BF7-AA2A-B837B51416B4}">
   <ds:schemaRefs>
     <ds:schemaRef ds:uri="http://schemas.microsoft.com/office/2006/metadata/contentType"/>
@@ -22238,6 +22507,16 @@
 </ds:datastoreItem>
 </file>
 
+<file path=customXml/itemProps2.xml><?xml version="1.0" encoding="utf-8"?>
+<ds:datastoreItem xmlns:ds="http://schemas.openxmlformats.org/officeDocument/2006/customXml" ds:itemID="{99919F73-B6C2-4A43-95E2-833EC48925FE}">
+  <ds:schemaRefs>
+    <ds:schemaRef ds:uri="http://schemas.microsoft.com/office/2006/metadata/properties"/>
+    <ds:schemaRef ds:uri="http://schemas.microsoft.com/office/infopath/2007/PartnerControls"/>
+    <ds:schemaRef ds:uri="71af3243-3dd4-4a8d-8c0d-dd76da1f02a5"/>
+  </ds:schemaRefs>
+</ds:datastoreItem>
+</file>
+
 <file path=customXml/itemProps3.xml><?xml version="1.0" encoding="utf-8"?>
 <ds:datastoreItem xmlns:ds="http://schemas.openxmlformats.org/officeDocument/2006/customXml" ds:itemID="{3C8E00D1-8EA3-4E42-801D-0253E1EAFC21}">
   <ds:schemaRefs>

</xml_diff>

<commit_message>
aggiornate note della presentazione
</commit_message>
<xml_diff>
--- a/presentazioneMLDA.pptx
+++ b/presentazioneMLDA.pptx
@@ -1273,6 +1273,111 @@
               <a:t>Matteo: Notare il tempo di esecuzione!!</a:t>
             </a:r>
           </a:p>
+          <a:p>
+            <a:r>
+              <a:rPr lang="it-IT" dirty="0"/>
+              <a:t>gamma del kernel </a:t>
+            </a:r>
+            <a:r>
+              <a:rPr lang="it-IT" dirty="0" err="1"/>
+              <a:t>radial</a:t>
+            </a:r>
+            <a:r>
+              <a:rPr lang="it-IT" dirty="0"/>
+              <a:t> </a:t>
+            </a:r>
+            <a:r>
+              <a:rPr lang="it-IT" dirty="0" err="1"/>
+              <a:t>basis</a:t>
+            </a:r>
+            <a:r>
+              <a:rPr lang="it-IT" dirty="0"/>
+              <a:t> = </a:t>
+            </a:r>
+            <a:r>
+              <a:rPr lang="it-IT" dirty="0" err="1"/>
+              <a:t>exp</a:t>
+            </a:r>
+            <a:r>
+              <a:rPr lang="it-IT" dirty="0"/>
+              <a:t>(-gamma*||u-v||^2) </a:t>
+            </a:r>
+          </a:p>
+          <a:p>
+            <a:r>
+              <a:rPr lang="it-IT" dirty="0"/>
+              <a:t>	+alto -&gt; </a:t>
+            </a:r>
+            <a:r>
+              <a:rPr lang="it-IT" dirty="0" err="1"/>
+              <a:t>soluz</a:t>
+            </a:r>
+            <a:r>
+              <a:rPr lang="it-IT" dirty="0"/>
+              <a:t>. + non lineare</a:t>
+            </a:r>
+          </a:p>
+          <a:p>
+            <a:r>
+              <a:rPr lang="it-IT" dirty="0"/>
+              <a:t>	- alto -&gt; </a:t>
+            </a:r>
+            <a:r>
+              <a:rPr lang="it-IT" dirty="0" err="1"/>
+              <a:t>soluz</a:t>
+            </a:r>
+            <a:r>
+              <a:rPr lang="it-IT" dirty="0"/>
+              <a:t>. – non lineare</a:t>
+            </a:r>
+          </a:p>
+          <a:p>
+            <a:r>
+              <a:rPr lang="it-IT" dirty="0"/>
+              <a:t>C: parametro regolarizzazione corrispondente ad alpha per KRLS</a:t>
+            </a:r>
+          </a:p>
+          <a:p>
+            <a:r>
+              <a:rPr lang="it-IT" dirty="0"/>
+              <a:t>Epsilon: </a:t>
+            </a:r>
+            <a:r>
+              <a:rPr lang="it-IT" dirty="0" err="1"/>
+              <a:t>loss</a:t>
+            </a:r>
+            <a:r>
+              <a:rPr lang="it-IT" dirty="0"/>
+              <a:t> </a:t>
+            </a:r>
+            <a:r>
+              <a:rPr lang="it-IT" dirty="0" err="1"/>
+              <a:t>function</a:t>
+            </a:r>
+            <a:r>
+              <a:rPr lang="it-IT" dirty="0"/>
+              <a:t> |</a:t>
+            </a:r>
+            <a:r>
+              <a:rPr lang="it-IT" dirty="0" err="1"/>
+              <a:t>Yi</a:t>
+            </a:r>
+            <a:r>
+              <a:rPr lang="it-IT" dirty="0"/>
+              <a:t> – </a:t>
+            </a:r>
+            <a:r>
+              <a:rPr lang="it-IT" dirty="0" err="1"/>
+              <a:t>WiXi</a:t>
+            </a:r>
+            <a:r>
+              <a:rPr lang="it-IT" dirty="0"/>
+              <a:t>! &lt;= epsilon</a:t>
+            </a:r>
+          </a:p>
+          <a:p>
+            <a:endParaRPr lang="it-IT" dirty="0"/>
+          </a:p>
         </p:txBody>
       </p:sp>
       <p:sp>
@@ -1419,6 +1524,48 @@
               <a:rPr lang="it-IT" dirty="0"/>
               <a:t>Matteo</a:t>
             </a:r>
+          </a:p>
+          <a:p>
+            <a:r>
+              <a:rPr lang="it-IT" dirty="0"/>
+              <a:t>Alpha: parametro di regolarizzazione (</a:t>
+            </a:r>
+            <a:r>
+              <a:rPr lang="it-IT" dirty="0" err="1"/>
+              <a:t>Q+lambda</a:t>
+            </a:r>
+            <a:r>
+              <a:rPr lang="it-IT" dirty="0"/>
+              <a:t>*I)^-1*Y</a:t>
+            </a:r>
+          </a:p>
+          <a:p>
+            <a:r>
+              <a:rPr lang="it-IT" dirty="0"/>
+              <a:t>Gamma: sempre </a:t>
+            </a:r>
+            <a:r>
+              <a:rPr lang="it-IT" dirty="0" err="1"/>
+              <a:t>radial</a:t>
+            </a:r>
+            <a:r>
+              <a:rPr lang="it-IT" dirty="0"/>
+              <a:t> </a:t>
+            </a:r>
+            <a:r>
+              <a:rPr lang="it-IT" dirty="0" err="1"/>
+              <a:t>basis</a:t>
+            </a:r>
+            <a:endParaRPr lang="it-IT" dirty="0"/>
+          </a:p>
+          <a:p>
+            <a:r>
+              <a:rPr lang="it-IT" dirty="0"/>
+              <a:t>Lambda: di alpha</a:t>
+            </a:r>
+          </a:p>
+          <a:p>
+            <a:endParaRPr lang="it-IT" dirty="0"/>
           </a:p>
         </p:txBody>
       </p:sp>
@@ -22250,6 +22397,15 @@
 </file>
 
 <file path=customXml/item1.xml><?xml version="1.0" encoding="utf-8"?>
+<p:properties xmlns:p="http://schemas.microsoft.com/office/2006/metadata/properties" xmlns:xsi="http://www.w3.org/2001/XMLSchema-instance" xmlns:pc="http://schemas.microsoft.com/office/infopath/2007/PartnerControls">
+  <documentManagement>
+    <Status xmlns="71af3243-3dd4-4a8d-8c0d-dd76da1f02a5">Not started</Status>
+    <MediaServiceKeyPoints xmlns="71af3243-3dd4-4a8d-8c0d-dd76da1f02a5" xsi:nil="true"/>
+  </documentManagement>
+</p:properties>
+</file>
+
+<file path=customXml/item2.xml><?xml version="1.0" encoding="utf-8"?>
 <ct:contentTypeSchema xmlns:ct="http://schemas.microsoft.com/office/2006/metadata/contentType" xmlns:ma="http://schemas.microsoft.com/office/2006/metadata/properties/metaAttributes" ct:_="" ma:_="" ma:contentTypeName="Document" ma:contentTypeID="0x01010079F111ED35F8CC479449609E8A0923A6" ma:contentTypeVersion="12" ma:contentTypeDescription="Create a new document." ma:contentTypeScope="" ma:versionID="426e97fa315356fffbdcd9876fe988c2">
   <xsd:schema xmlns:xsd="http://www.w3.org/2001/XMLSchema" xmlns:xs="http://www.w3.org/2001/XMLSchema" xmlns:p="http://schemas.microsoft.com/office/2006/metadata/properties" xmlns:ns2="71af3243-3dd4-4a8d-8c0d-dd76da1f02a5" xmlns:ns3="16c05727-aa75-4e4a-9b5f-8a80a1165891" targetNamespace="http://schemas.microsoft.com/office/2006/metadata/properties" ma:root="true" ma:fieldsID="14b8f0def80e6d70ce3def20c90759ae" ns2:_="" ns3:_="">
     <xsd:import namespace="71af3243-3dd4-4a8d-8c0d-dd76da1f02a5"/>
@@ -22470,15 +22626,6 @@
 </ct:contentTypeSchema>
 </file>
 
-<file path=customXml/item2.xml><?xml version="1.0" encoding="utf-8"?>
-<p:properties xmlns:p="http://schemas.microsoft.com/office/2006/metadata/properties" xmlns:xsi="http://www.w3.org/2001/XMLSchema-instance" xmlns:pc="http://schemas.microsoft.com/office/infopath/2007/PartnerControls">
-  <documentManagement>
-    <Status xmlns="71af3243-3dd4-4a8d-8c0d-dd76da1f02a5">Not started</Status>
-    <MediaServiceKeyPoints xmlns="71af3243-3dd4-4a8d-8c0d-dd76da1f02a5" xsi:nil="true"/>
-  </documentManagement>
-</p:properties>
-</file>
-
 <file path=customXml/item3.xml><?xml version="1.0" encoding="utf-8"?>
 <?mso-contentType ?>
 <FormTemplates xmlns="http://schemas.microsoft.com/sharepoint/v3/contenttype/forms">
@@ -22489,6 +22636,16 @@
 </file>
 
 <file path=customXml/itemProps1.xml><?xml version="1.0" encoding="utf-8"?>
+<ds:datastoreItem xmlns:ds="http://schemas.openxmlformats.org/officeDocument/2006/customXml" ds:itemID="{99919F73-B6C2-4A43-95E2-833EC48925FE}">
+  <ds:schemaRefs>
+    <ds:schemaRef ds:uri="http://schemas.microsoft.com/office/2006/metadata/properties"/>
+    <ds:schemaRef ds:uri="http://schemas.microsoft.com/office/infopath/2007/PartnerControls"/>
+    <ds:schemaRef ds:uri="71af3243-3dd4-4a8d-8c0d-dd76da1f02a5"/>
+  </ds:schemaRefs>
+</ds:datastoreItem>
+</file>
+
+<file path=customXml/itemProps2.xml><?xml version="1.0" encoding="utf-8"?>
 <ds:datastoreItem xmlns:ds="http://schemas.openxmlformats.org/officeDocument/2006/customXml" ds:itemID="{ABC329F5-30EE-4BF7-AA2A-B837B51416B4}">
   <ds:schemaRefs>
     <ds:schemaRef ds:uri="http://schemas.microsoft.com/office/2006/metadata/contentType"/>
@@ -22507,16 +22664,6 @@
 </ds:datastoreItem>
 </file>
 
-<file path=customXml/itemProps2.xml><?xml version="1.0" encoding="utf-8"?>
-<ds:datastoreItem xmlns:ds="http://schemas.openxmlformats.org/officeDocument/2006/customXml" ds:itemID="{99919F73-B6C2-4A43-95E2-833EC48925FE}">
-  <ds:schemaRefs>
-    <ds:schemaRef ds:uri="http://schemas.microsoft.com/office/2006/metadata/properties"/>
-    <ds:schemaRef ds:uri="http://schemas.microsoft.com/office/infopath/2007/PartnerControls"/>
-    <ds:schemaRef ds:uri="71af3243-3dd4-4a8d-8c0d-dd76da1f02a5"/>
-  </ds:schemaRefs>
-</ds:datastoreItem>
-</file>
-
 <file path=customXml/itemProps3.xml><?xml version="1.0" encoding="utf-8"?>
 <ds:datastoreItem xmlns:ds="http://schemas.openxmlformats.org/officeDocument/2006/customXml" ds:itemID="{3C8E00D1-8EA3-4E42-801D-0253E1EAFC21}">
   <ds:schemaRefs>

</xml_diff>

<commit_message>
aggiunta possibilità di rimuovere la riga fumatori in Main.py, aggiornata presentazioneMLDA.pptx di conseguenza
</commit_message>
<xml_diff>
--- a/presentazioneMLDA.pptx
+++ b/presentazioneMLDA.pptx
@@ -13665,7 +13665,7 @@
         <p:spPr>
           <a:xfrm>
             <a:off x="0" y="2071131"/>
-            <a:ext cx="12192000" cy="3785652"/>
+            <a:ext cx="12192000" cy="4093428"/>
           </a:xfrm>
           <a:prstGeom prst="rect">
             <a:avLst/>
@@ -14637,6 +14637,38 @@
               <a:defRPr/>
             </a:pPr>
             <a:r>
+              <a:rPr lang="en-US" sz="2000" dirty="0">
+                <a:solidFill>
+                  <a:prstClr val="white"/>
+                </a:solidFill>
+                <a:latin typeface="Univers"/>
+              </a:rPr>
+              <a:t>In our tests we also considered the row of smokers, but it’s possible to delete it.</a:t>
+            </a:r>
+            <a:endParaRPr lang="it-IT" sz="2000" dirty="0">
+              <a:solidFill>
+                <a:prstClr val="white"/>
+              </a:solidFill>
+              <a:latin typeface="Univers"/>
+            </a:endParaRPr>
+          </a:p>
+          <a:p>
+            <a:pPr marR="0" lvl="0" algn="l" defTabSz="914400" rtl="0" eaLnBrk="1" fontAlgn="auto" latinLnBrk="0" hangingPunct="1">
+              <a:lnSpc>
+                <a:spcPct val="100000"/>
+              </a:lnSpc>
+              <a:spcBef>
+                <a:spcPts val="0"/>
+              </a:spcBef>
+              <a:spcAft>
+                <a:spcPts val="0"/>
+              </a:spcAft>
+              <a:buClrTx/>
+              <a:buSzTx/>
+              <a:tabLst/>
+              <a:defRPr/>
+            </a:pPr>
+            <a:r>
               <a:rPr lang="it-IT" sz="2000" dirty="0">
                 <a:solidFill>
                   <a:prstClr val="white"/>
@@ -14715,7 +14747,7 @@
                 </a:solidFill>
                 <a:latin typeface="Univers"/>
               </a:rPr>
-              <a:t> library. </a:t>
+              <a:t> library.</a:t>
             </a:r>
           </a:p>
         </p:txBody>
@@ -22431,6 +22463,15 @@
 </file>
 
 <file path=customXml/item1.xml><?xml version="1.0" encoding="utf-8"?>
+<p:properties xmlns:p="http://schemas.microsoft.com/office/2006/metadata/properties" xmlns:xsi="http://www.w3.org/2001/XMLSchema-instance" xmlns:pc="http://schemas.microsoft.com/office/infopath/2007/PartnerControls">
+  <documentManagement>
+    <Status xmlns="71af3243-3dd4-4a8d-8c0d-dd76da1f02a5">Not started</Status>
+    <MediaServiceKeyPoints xmlns="71af3243-3dd4-4a8d-8c0d-dd76da1f02a5" xsi:nil="true"/>
+  </documentManagement>
+</p:properties>
+</file>
+
+<file path=customXml/item2.xml><?xml version="1.0" encoding="utf-8"?>
 <ct:contentTypeSchema xmlns:ct="http://schemas.microsoft.com/office/2006/metadata/contentType" xmlns:ma="http://schemas.microsoft.com/office/2006/metadata/properties/metaAttributes" ct:_="" ma:_="" ma:contentTypeName="Document" ma:contentTypeID="0x01010079F111ED35F8CC479449609E8A0923A6" ma:contentTypeVersion="12" ma:contentTypeDescription="Create a new document." ma:contentTypeScope="" ma:versionID="426e97fa315356fffbdcd9876fe988c2">
   <xsd:schema xmlns:xsd="http://www.w3.org/2001/XMLSchema" xmlns:xs="http://www.w3.org/2001/XMLSchema" xmlns:p="http://schemas.microsoft.com/office/2006/metadata/properties" xmlns:ns2="71af3243-3dd4-4a8d-8c0d-dd76da1f02a5" xmlns:ns3="16c05727-aa75-4e4a-9b5f-8a80a1165891" targetNamespace="http://schemas.microsoft.com/office/2006/metadata/properties" ma:root="true" ma:fieldsID="14b8f0def80e6d70ce3def20c90759ae" ns2:_="" ns3:_="">
     <xsd:import namespace="71af3243-3dd4-4a8d-8c0d-dd76da1f02a5"/>
@@ -22651,15 +22692,6 @@
 </ct:contentTypeSchema>
 </file>
 
-<file path=customXml/item2.xml><?xml version="1.0" encoding="utf-8"?>
-<p:properties xmlns:p="http://schemas.microsoft.com/office/2006/metadata/properties" xmlns:xsi="http://www.w3.org/2001/XMLSchema-instance" xmlns:pc="http://schemas.microsoft.com/office/infopath/2007/PartnerControls">
-  <documentManagement>
-    <Status xmlns="71af3243-3dd4-4a8d-8c0d-dd76da1f02a5">Not started</Status>
-    <MediaServiceKeyPoints xmlns="71af3243-3dd4-4a8d-8c0d-dd76da1f02a5" xsi:nil="true"/>
-  </documentManagement>
-</p:properties>
-</file>
-
 <file path=customXml/item3.xml><?xml version="1.0" encoding="utf-8"?>
 <?mso-contentType ?>
 <FormTemplates xmlns="http://schemas.microsoft.com/sharepoint/v3/contenttype/forms">
@@ -22670,6 +22702,16 @@
 </file>
 
 <file path=customXml/itemProps1.xml><?xml version="1.0" encoding="utf-8"?>
+<ds:datastoreItem xmlns:ds="http://schemas.openxmlformats.org/officeDocument/2006/customXml" ds:itemID="{99919F73-B6C2-4A43-95E2-833EC48925FE}">
+  <ds:schemaRefs>
+    <ds:schemaRef ds:uri="http://schemas.microsoft.com/office/2006/metadata/properties"/>
+    <ds:schemaRef ds:uri="http://schemas.microsoft.com/office/infopath/2007/PartnerControls"/>
+    <ds:schemaRef ds:uri="71af3243-3dd4-4a8d-8c0d-dd76da1f02a5"/>
+  </ds:schemaRefs>
+</ds:datastoreItem>
+</file>
+
+<file path=customXml/itemProps2.xml><?xml version="1.0" encoding="utf-8"?>
 <ds:datastoreItem xmlns:ds="http://schemas.openxmlformats.org/officeDocument/2006/customXml" ds:itemID="{ABC329F5-30EE-4BF7-AA2A-B837B51416B4}">
   <ds:schemaRefs>
     <ds:schemaRef ds:uri="http://schemas.microsoft.com/office/2006/metadata/contentType"/>
@@ -22688,16 +22730,6 @@
 </ds:datastoreItem>
 </file>
 
-<file path=customXml/itemProps2.xml><?xml version="1.0" encoding="utf-8"?>
-<ds:datastoreItem xmlns:ds="http://schemas.openxmlformats.org/officeDocument/2006/customXml" ds:itemID="{99919F73-B6C2-4A43-95E2-833EC48925FE}">
-  <ds:schemaRefs>
-    <ds:schemaRef ds:uri="http://schemas.microsoft.com/office/2006/metadata/properties"/>
-    <ds:schemaRef ds:uri="http://schemas.microsoft.com/office/infopath/2007/PartnerControls"/>
-    <ds:schemaRef ds:uri="71af3243-3dd4-4a8d-8c0d-dd76da1f02a5"/>
-  </ds:schemaRefs>
-</ds:datastoreItem>
-</file>
-
 <file path=customXml/itemProps3.xml><?xml version="1.0" encoding="utf-8"?>
 <ds:datastoreItem xmlns:ds="http://schemas.openxmlformats.org/officeDocument/2006/customXml" ds:itemID="{3C8E00D1-8EA3-4E42-801D-0253E1EAFC21}">
   <ds:schemaRefs>

</xml_diff>

<commit_message>
aggiornati refusi su presentazioneMLDA.pptx
</commit_message>
<xml_diff>
--- a/presentazioneMLDA.pptx
+++ b/presentazioneMLDA.pptx
@@ -1561,7 +1561,7 @@
           <a:p>
             <a:r>
               <a:rPr lang="it-IT" dirty="0"/>
-              <a:t>Lambda: di alpha. </a:t>
+              <a:t>Lambda: di alpha, regola complessità soluzione</a:t>
             </a:r>
           </a:p>
           <a:p>
@@ -1582,6 +1582,28 @@
             <a:r>
               <a:rPr lang="it-IT" dirty="0"/>
               <a:t> </a:t>
+            </a:r>
+          </a:p>
+          <a:p>
+            <a:r>
+              <a:rPr lang="it-IT" dirty="0"/>
+              <a:t>Loss: </a:t>
+            </a:r>
+            <a:r>
+              <a:rPr lang="it-IT" dirty="0" err="1"/>
+              <a:t>square</a:t>
+            </a:r>
+            <a:r>
+              <a:rPr lang="it-IT" dirty="0"/>
+              <a:t> </a:t>
+            </a:r>
+            <a:r>
+              <a:rPr lang="it-IT" dirty="0" err="1"/>
+              <a:t>loss</a:t>
+            </a:r>
+            <a:r>
+              <a:rPr lang="it-IT" dirty="0"/>
+              <a:t> (y-f(a))^2</a:t>
             </a:r>
           </a:p>
           <a:p>
@@ -1739,15 +1761,7 @@
             </a:r>
             <a:r>
               <a:rPr lang="it-IT" dirty="0"/>
-              <a:t> (più di </a:t>
-            </a:r>
-            <a:r>
-              <a:rPr lang="it-IT"/>
-              <a:t>1 minuto e mezzo!!), </a:t>
-            </a:r>
-            <a:r>
-              <a:rPr lang="it-IT" dirty="0"/>
-              <a:t>il più veloce (ovviamente) linear </a:t>
+              <a:t> (più di 1 minuto e mezzo!!), il più veloce (ovviamente) linear </a:t>
             </a:r>
             <a:r>
               <a:rPr lang="it-IT" dirty="0" err="1"/>
@@ -1756,6 +1770,20 @@
             <a:r>
               <a:rPr lang="it-IT" dirty="0"/>
               <a:t> e il più preciso KRLS.</a:t>
+            </a:r>
+          </a:p>
+          <a:p>
+            <a:r>
+              <a:rPr lang="it-IT" dirty="0"/>
+              <a:t>Ricordo R^2 (coefficiente di determinazione) parametro </a:t>
+            </a:r>
+            <a:r>
+              <a:rPr lang="it-IT" dirty="0" err="1"/>
+              <a:t>Accuracy</a:t>
+            </a:r>
+            <a:r>
+              <a:rPr lang="it-IT" dirty="0"/>
+              <a:t> </a:t>
             </a:r>
           </a:p>
         </p:txBody>
@@ -14643,7 +14671,7 @@
                 </a:solidFill>
                 <a:latin typeface="Univers"/>
               </a:rPr>
-              <a:t>In our tests we also considered the row of smokers, but it’s possible to delete it.</a:t>
+              <a:t>In our tests we also considered the column of smokers, but it’s possible to delete it.</a:t>
             </a:r>
             <a:endParaRPr lang="it-IT" sz="2000" dirty="0">
               <a:solidFill>
@@ -17886,7 +17914,7 @@
         <p:spPr>
           <a:xfrm>
             <a:off x="0" y="2071131"/>
-            <a:ext cx="12192000" cy="3785652"/>
+            <a:ext cx="12192000" cy="4093428"/>
           </a:xfrm>
           <a:prstGeom prst="rect">
             <a:avLst/>
@@ -18398,7 +18426,7 @@
                   <a:schemeClr val="bg1"/>
                 </a:solidFill>
               </a:rPr>
-              <a:t>rows</a:t>
+              <a:t>columns</a:t>
             </a:r>
             <a:r>
               <a:rPr lang="it-IT" sz="2000" dirty="0">
@@ -22463,15 +22491,6 @@
 </file>
 
 <file path=customXml/item1.xml><?xml version="1.0" encoding="utf-8"?>
-<p:properties xmlns:p="http://schemas.microsoft.com/office/2006/metadata/properties" xmlns:xsi="http://www.w3.org/2001/XMLSchema-instance" xmlns:pc="http://schemas.microsoft.com/office/infopath/2007/PartnerControls">
-  <documentManagement>
-    <Status xmlns="71af3243-3dd4-4a8d-8c0d-dd76da1f02a5">Not started</Status>
-    <MediaServiceKeyPoints xmlns="71af3243-3dd4-4a8d-8c0d-dd76da1f02a5" xsi:nil="true"/>
-  </documentManagement>
-</p:properties>
-</file>
-
-<file path=customXml/item2.xml><?xml version="1.0" encoding="utf-8"?>
 <ct:contentTypeSchema xmlns:ct="http://schemas.microsoft.com/office/2006/metadata/contentType" xmlns:ma="http://schemas.microsoft.com/office/2006/metadata/properties/metaAttributes" ct:_="" ma:_="" ma:contentTypeName="Document" ma:contentTypeID="0x01010079F111ED35F8CC479449609E8A0923A6" ma:contentTypeVersion="12" ma:contentTypeDescription="Create a new document." ma:contentTypeScope="" ma:versionID="426e97fa315356fffbdcd9876fe988c2">
   <xsd:schema xmlns:xsd="http://www.w3.org/2001/XMLSchema" xmlns:xs="http://www.w3.org/2001/XMLSchema" xmlns:p="http://schemas.microsoft.com/office/2006/metadata/properties" xmlns:ns2="71af3243-3dd4-4a8d-8c0d-dd76da1f02a5" xmlns:ns3="16c05727-aa75-4e4a-9b5f-8a80a1165891" targetNamespace="http://schemas.microsoft.com/office/2006/metadata/properties" ma:root="true" ma:fieldsID="14b8f0def80e6d70ce3def20c90759ae" ns2:_="" ns3:_="">
     <xsd:import namespace="71af3243-3dd4-4a8d-8c0d-dd76da1f02a5"/>
@@ -22692,6 +22711,15 @@
 </ct:contentTypeSchema>
 </file>
 
+<file path=customXml/item2.xml><?xml version="1.0" encoding="utf-8"?>
+<p:properties xmlns:p="http://schemas.microsoft.com/office/2006/metadata/properties" xmlns:xsi="http://www.w3.org/2001/XMLSchema-instance" xmlns:pc="http://schemas.microsoft.com/office/infopath/2007/PartnerControls">
+  <documentManagement>
+    <Status xmlns="71af3243-3dd4-4a8d-8c0d-dd76da1f02a5">Not started</Status>
+    <MediaServiceKeyPoints xmlns="71af3243-3dd4-4a8d-8c0d-dd76da1f02a5" xsi:nil="true"/>
+  </documentManagement>
+</p:properties>
+</file>
+
 <file path=customXml/item3.xml><?xml version="1.0" encoding="utf-8"?>
 <?mso-contentType ?>
 <FormTemplates xmlns="http://schemas.microsoft.com/sharepoint/v3/contenttype/forms">
@@ -22702,16 +22730,6 @@
 </file>
 
 <file path=customXml/itemProps1.xml><?xml version="1.0" encoding="utf-8"?>
-<ds:datastoreItem xmlns:ds="http://schemas.openxmlformats.org/officeDocument/2006/customXml" ds:itemID="{99919F73-B6C2-4A43-95E2-833EC48925FE}">
-  <ds:schemaRefs>
-    <ds:schemaRef ds:uri="http://schemas.microsoft.com/office/2006/metadata/properties"/>
-    <ds:schemaRef ds:uri="http://schemas.microsoft.com/office/infopath/2007/PartnerControls"/>
-    <ds:schemaRef ds:uri="71af3243-3dd4-4a8d-8c0d-dd76da1f02a5"/>
-  </ds:schemaRefs>
-</ds:datastoreItem>
-</file>
-
-<file path=customXml/itemProps2.xml><?xml version="1.0" encoding="utf-8"?>
 <ds:datastoreItem xmlns:ds="http://schemas.openxmlformats.org/officeDocument/2006/customXml" ds:itemID="{ABC329F5-30EE-4BF7-AA2A-B837B51416B4}">
   <ds:schemaRefs>
     <ds:schemaRef ds:uri="http://schemas.microsoft.com/office/2006/metadata/contentType"/>
@@ -22730,6 +22748,16 @@
 </ds:datastoreItem>
 </file>
 
+<file path=customXml/itemProps2.xml><?xml version="1.0" encoding="utf-8"?>
+<ds:datastoreItem xmlns:ds="http://schemas.openxmlformats.org/officeDocument/2006/customXml" ds:itemID="{99919F73-B6C2-4A43-95E2-833EC48925FE}">
+  <ds:schemaRefs>
+    <ds:schemaRef ds:uri="http://schemas.microsoft.com/office/2006/metadata/properties"/>
+    <ds:schemaRef ds:uri="http://schemas.microsoft.com/office/infopath/2007/PartnerControls"/>
+    <ds:schemaRef ds:uri="71af3243-3dd4-4a8d-8c0d-dd76da1f02a5"/>
+  </ds:schemaRefs>
+</ds:datastoreItem>
+</file>
+
 <file path=customXml/itemProps3.xml><?xml version="1.0" encoding="utf-8"?>
 <ds:datastoreItem xmlns:ds="http://schemas.openxmlformats.org/officeDocument/2006/customXml" ds:itemID="{3C8E00D1-8EA3-4E42-801D-0253E1EAFC21}">
   <ds:schemaRefs>

</xml_diff>